<commit_message>
Finalizing to Page 8
</commit_message>
<xml_diff>
--- a/ShookaDesktop Guide - English.pptx
+++ b/ShookaDesktop Guide - English.pptx
@@ -25191,24 +25191,15 @@
           <a:lstStyle/>
           <a:p>
             <a:r>
-              <a:rPr lang="fa-IR" sz="2800" dirty="0">
+              <a:rPr lang="en-US" sz="2800" b="1" dirty="0" smtClean="0">
                 <a:solidFill>
                   <a:srgbClr val="0070C0"/>
                 </a:solidFill>
                 <a:cs typeface="B Titr" pitchFamily="2" charset="-78"/>
               </a:rPr>
-              <a:t>راهنمای </a:t>
-            </a:r>
-            <a:r>
-              <a:rPr lang="fa-IR" sz="2800" dirty="0" smtClean="0">
-                <a:solidFill>
-                  <a:srgbClr val="0070C0"/>
-                </a:solidFill>
-                <a:cs typeface="B Titr" pitchFamily="2" charset="-78"/>
-              </a:rPr>
-              <a:t>پنجره تست دستگاه‌های صوتی</a:t>
-            </a:r>
-            <a:endParaRPr lang="en-US" sz="2800" dirty="0"/>
+              <a:t>Audio Devices Test Window</a:t>
+            </a:r>
+            <a:endParaRPr lang="en-US" sz="2800" b="1" dirty="0"/>
           </a:p>
         </p:txBody>
       </p:sp>
@@ -25930,22 +25921,22 @@
           <a:lstStyle/>
           <a:p>
             <a:r>
-              <a:rPr lang="fa-IR" sz="2800" dirty="0">
+              <a:rPr lang="en-US" sz="2800" b="1" dirty="0" smtClean="0">
                 <a:solidFill>
                   <a:srgbClr val="0070C0"/>
                 </a:solidFill>
                 <a:cs typeface="B Titr" pitchFamily="2" charset="-78"/>
               </a:rPr>
-              <a:t>راهنمای </a:t>
-            </a:r>
-            <a:r>
-              <a:rPr lang="fa-IR" sz="2800" dirty="0" smtClean="0">
+              <a:t>Video </a:t>
+            </a:r>
+            <a:r>
+              <a:rPr lang="en-US" sz="2800" b="1" dirty="0">
                 <a:solidFill>
                   <a:srgbClr val="0070C0"/>
                 </a:solidFill>
                 <a:cs typeface="B Titr" pitchFamily="2" charset="-78"/>
               </a:rPr>
-              <a:t>پنجره تست دستگاه‌های تصویری</a:t>
+              <a:t>Devices Test Window</a:t>
             </a:r>
             <a:endParaRPr lang="en-US" sz="2800" dirty="0"/>
           </a:p>
@@ -26784,24 +26775,15 @@
           <a:lstStyle/>
           <a:p>
             <a:r>
-              <a:rPr lang="fa-IR" sz="2800" dirty="0">
+              <a:rPr lang="en-US" sz="2800" b="1" dirty="0" smtClean="0">
                 <a:solidFill>
                   <a:srgbClr val="0070C0"/>
                 </a:solidFill>
                 <a:cs typeface="B Titr" pitchFamily="2" charset="-78"/>
               </a:rPr>
-              <a:t>راهنمای پنجره </a:t>
-            </a:r>
-            <a:r>
-              <a:rPr lang="fa-IR" sz="2800" dirty="0" smtClean="0">
-                <a:solidFill>
-                  <a:srgbClr val="0070C0"/>
-                </a:solidFill>
-                <a:cs typeface="B Titr" pitchFamily="2" charset="-78"/>
-              </a:rPr>
-              <a:t>ارسال گزارش خطا</a:t>
-            </a:r>
-            <a:endParaRPr lang="en-US" sz="2800" dirty="0"/>
+              <a:t>Bug Report Window</a:t>
+            </a:r>
+            <a:endParaRPr lang="en-US" sz="2800" b="1" dirty="0"/>
           </a:p>
         </p:txBody>
       </p:sp>
@@ -26813,8 +26795,8 @@
         </p:nvSpPr>
         <p:spPr>
           <a:xfrm>
-            <a:off x="457200" y="1690255"/>
-            <a:ext cx="4824391" cy="6340197"/>
+            <a:off x="457200" y="1479352"/>
+            <a:ext cx="4824391" cy="4616648"/>
           </a:xfrm>
           <a:prstGeom prst="rect">
             <a:avLst/>
@@ -26860,7 +26842,23 @@
             </a:r>
             <a:r>
               <a:rPr lang="en-US" sz="1400" dirty="0" smtClean="0"/>
-              <a:t>Email Address. (If your email address has been saved in your profile already, it will be written here automatically)</a:t>
+              <a:t>Email Address. (If your email address has been </a:t>
+            </a:r>
+            <a:r>
+              <a:rPr lang="en-US" sz="1400" dirty="0"/>
+              <a:t>stored already </a:t>
+            </a:r>
+            <a:r>
+              <a:rPr lang="en-US" sz="1400" dirty="0" smtClean="0"/>
+              <a:t>in your </a:t>
+            </a:r>
+            <a:r>
+              <a:rPr lang="en-US" sz="1400" dirty="0" smtClean="0"/>
+              <a:t>profile, </a:t>
+            </a:r>
+            <a:r>
+              <a:rPr lang="en-US" sz="1400" dirty="0" smtClean="0"/>
+              <a:t>it will be written here automatically)</a:t>
             </a:r>
           </a:p>
           <a:p>
@@ -26934,21 +26932,8 @@
                   <a:srgbClr val="7030A0"/>
                 </a:solidFill>
               </a:rPr>
-              <a:t>upport center be able to</a:t>
-            </a:r>
-            <a:r>
-              <a:rPr lang="en-US" sz="1400" b="1" dirty="0" smtClean="0">
-                <a:solidFill>
-                  <a:srgbClr val="7030A0"/>
-                </a:solidFill>
-              </a:rPr>
-              <a:t> contact you for solving the problem.</a:t>
-            </a:r>
-            <a:endParaRPr lang="en-US" sz="1400" b="1" dirty="0" smtClean="0">
-              <a:solidFill>
-                <a:srgbClr val="7030A0"/>
-              </a:solidFill>
-            </a:endParaRPr>
+              <a:t>upport center be able to contact you for solving the problem.</a:t>
+            </a:r>
           </a:p>
           <a:p>
             <a:pPr algn="just"/>
@@ -26966,7 +26951,23 @@
             </a:r>
             <a:r>
               <a:rPr lang="en-US" sz="1400" dirty="0" smtClean="0"/>
-              <a:t>By clicking this button, software detailed report will send to support center automatically but if you have any description about </a:t>
+              <a:t>By clicking this button, </a:t>
+            </a:r>
+            <a:r>
+              <a:rPr lang="en-US" sz="1400" dirty="0" smtClean="0"/>
+              <a:t>all software activity details will be sent to </a:t>
+            </a:r>
+            <a:r>
+              <a:rPr lang="en-US" sz="1400" dirty="0" smtClean="0"/>
+              <a:t>support center automatically but if you have any description about </a:t>
+            </a:r>
+            <a:r>
+              <a:rPr lang="en-US" sz="1400" dirty="0" smtClean="0"/>
+              <a:t>how, </a:t>
+            </a:r>
+            <a:r>
+              <a:rPr lang="en-US" sz="1400" dirty="0" smtClean="0"/>
+              <a:t>when or form of happening error, you may write it here.</a:t>
             </a:r>
             <a:endParaRPr lang="en-US" sz="1400" dirty="0"/>
           </a:p>
@@ -26985,197 +26986,48 @@
               <a:t>5- </a:t>
             </a:r>
             <a:r>
-              <a:rPr lang="en-US" sz="1400" dirty="0"/>
-              <a:t>Your Name</a:t>
-            </a:r>
-          </a:p>
-          <a:p>
+              <a:rPr lang="en-US" sz="1400" dirty="0" smtClean="0"/>
+              <a:t>Click this button to send your report whenever you complete above information.</a:t>
+            </a:r>
+          </a:p>
+          <a:p>
+            <a:pPr algn="just"/>
             <a:endParaRPr lang="en-US" sz="1400" dirty="0"/>
           </a:p>
           <a:p>
+            <a:pPr algn="just"/>
+            <a:r>
+              <a:rPr lang="en-US" sz="1400" dirty="0" smtClean="0">
+                <a:solidFill>
+                  <a:srgbClr val="FF0000"/>
+                </a:solidFill>
+              </a:rPr>
+              <a:t>6- </a:t>
+            </a:r>
+            <a:r>
+              <a:rPr lang="en-US" sz="1400" dirty="0" smtClean="0"/>
+              <a:t>Cancellation of sending report.</a:t>
+            </a:r>
+          </a:p>
+          <a:p>
+            <a:pPr algn="just"/>
             <a:endParaRPr lang="en-US" sz="1400" dirty="0"/>
           </a:p>
           <a:p>
-            <a:endParaRPr lang="fa-IR" sz="1400" dirty="0" smtClean="0"/>
-          </a:p>
-          <a:p>
-            <a:pPr algn="just" rtl="1"/>
+            <a:pPr algn="just"/>
             <a:r>
               <a:rPr lang="en-US" sz="1400" dirty="0" smtClean="0">
                 <a:solidFill>
                   <a:srgbClr val="FF0000"/>
                 </a:solidFill>
               </a:rPr>
-              <a:t>1</a:t>
-            </a:r>
-            <a:r>
-              <a:rPr lang="fa-IR" sz="1400" dirty="0" smtClean="0">
-                <a:solidFill>
-                  <a:srgbClr val="FF0000"/>
-                </a:solidFill>
-              </a:rPr>
-              <a:t>-</a:t>
-            </a:r>
-            <a:r>
-              <a:rPr lang="fa-IR" sz="1400" dirty="0" smtClean="0">
-                <a:cs typeface="B Nazanin" pitchFamily="2" charset="-78"/>
-              </a:rPr>
-              <a:t> نام شما جهت پاسخگویی واحد پشتیبانی</a:t>
-            </a:r>
-          </a:p>
-          <a:p>
-            <a:pPr algn="just" rtl="1"/>
-            <a:r>
-              <a:rPr lang="fa-IR" sz="1400" dirty="0" smtClean="0">
-                <a:solidFill>
-                  <a:srgbClr val="FF0000"/>
-                </a:solidFill>
-              </a:rPr>
-              <a:t>2- </a:t>
-            </a:r>
-            <a:r>
-              <a:rPr lang="fa-IR" sz="1400" dirty="0" smtClean="0">
-                <a:cs typeface="B Nazanin" pitchFamily="2" charset="-78"/>
-              </a:rPr>
-              <a:t>آدرس ایمیل شما جهت پاسخگویی ایمیلی واحد پشتیبانی. (اگر آدرس ایمیلتان را در پروفایلتان ثبت کنید، بطورخودکار در اینجا نوشته می‌شود)</a:t>
-            </a:r>
-          </a:p>
-          <a:p>
-            <a:pPr algn="just" rtl="1"/>
-            <a:r>
-              <a:rPr lang="fa-IR" sz="1400" dirty="0" smtClean="0">
-                <a:solidFill>
-                  <a:srgbClr val="FF0000"/>
-                </a:solidFill>
-              </a:rPr>
-              <a:t>3-</a:t>
-            </a:r>
-            <a:r>
-              <a:rPr lang="fa-IR" sz="1400" dirty="0" smtClean="0">
-                <a:cs typeface="B Nazanin" pitchFamily="2" charset="-78"/>
-              </a:rPr>
-              <a:t> شماره تماس شما جهت پاسخگویی تلفنی واحد پشتیبانی</a:t>
-            </a:r>
-          </a:p>
-          <a:p>
-            <a:pPr algn="ctr" rtl="1"/>
-            <a:r>
-              <a:rPr lang="fa-IR" sz="1400" b="1" dirty="0" smtClean="0">
-                <a:solidFill>
-                  <a:srgbClr val="7030A0"/>
-                </a:solidFill>
-                <a:cs typeface="B Nazanin" pitchFamily="2" charset="-78"/>
-              </a:rPr>
-              <a:t>ورود آدرس ایمیل </a:t>
-            </a:r>
-            <a:r>
-              <a:rPr lang="fa-IR" sz="1400" b="1" dirty="0">
-                <a:solidFill>
-                  <a:srgbClr val="7030A0"/>
-                </a:solidFill>
-                <a:cs typeface="B Nazanin" pitchFamily="2" charset="-78"/>
-              </a:rPr>
-              <a:t>و</a:t>
-            </a:r>
-            <a:r>
-              <a:rPr lang="fa-IR" sz="1400" b="1" dirty="0" smtClean="0">
-                <a:solidFill>
-                  <a:srgbClr val="7030A0"/>
-                </a:solidFill>
-                <a:cs typeface="B Nazanin" pitchFamily="2" charset="-78"/>
-              </a:rPr>
-              <a:t> شماره تماس ضروری است.</a:t>
-            </a:r>
-            <a:endParaRPr lang="en-US" sz="1400" b="1" dirty="0">
-              <a:solidFill>
-                <a:srgbClr val="7030A0"/>
-              </a:solidFill>
-            </a:endParaRPr>
-          </a:p>
-          <a:p>
-            <a:pPr algn="just" rtl="1"/>
-            <a:r>
-              <a:rPr lang="fa-IR" sz="1400" dirty="0" smtClean="0">
-                <a:solidFill>
-                  <a:srgbClr val="FF0000"/>
-                </a:solidFill>
-              </a:rPr>
-              <a:t>4- </a:t>
-            </a:r>
-            <a:r>
-              <a:rPr lang="fa-IR" sz="1400" dirty="0" smtClean="0">
-                <a:cs typeface="B Nazanin" pitchFamily="2" charset="-78"/>
-              </a:rPr>
-              <a:t>با کلیک دکمه ارسال خطا، گزارش جزئیات کارکرد نرم‌افزار برای واحد پشتیبانی ارسال می‌شود اما اگرراجع به زمان، علت یا شکل بروز خطا نکته‌ای دارید، می‌توانید آنرا اینجا بنویسید.</a:t>
-            </a:r>
-            <a:endParaRPr lang="en-US" sz="1400" dirty="0" smtClean="0">
-              <a:solidFill>
-                <a:srgbClr val="FF0000"/>
-              </a:solidFill>
-            </a:endParaRPr>
-          </a:p>
-          <a:p>
-            <a:pPr algn="just" rtl="1"/>
-            <a:r>
-              <a:rPr lang="fa-IR" sz="1400" dirty="0" smtClean="0">
-                <a:solidFill>
-                  <a:srgbClr val="FF0000"/>
-                </a:solidFill>
-              </a:rPr>
-              <a:t>5-</a:t>
-            </a:r>
-            <a:r>
-              <a:rPr lang="fa-IR" sz="1400" dirty="0" smtClean="0">
-                <a:solidFill>
-                  <a:srgbClr val="FF0000"/>
-                </a:solidFill>
-                <a:cs typeface="B Nazanin" pitchFamily="2" charset="-78"/>
-              </a:rPr>
-              <a:t> </a:t>
-            </a:r>
-            <a:r>
-              <a:rPr lang="fa-IR" sz="1400" dirty="0" smtClean="0">
-                <a:cs typeface="B Nazanin" pitchFamily="2" charset="-78"/>
-              </a:rPr>
-              <a:t>دکمه ارسال خطا</a:t>
-            </a:r>
-          </a:p>
-          <a:p>
-            <a:pPr algn="just" rtl="1"/>
-            <a:r>
-              <a:rPr lang="fa-IR" sz="1400" dirty="0" smtClean="0">
-                <a:solidFill>
-                  <a:srgbClr val="FF0000"/>
-                </a:solidFill>
-              </a:rPr>
-              <a:t>6- </a:t>
-            </a:r>
-            <a:r>
-              <a:rPr lang="fa-IR" sz="1400" dirty="0" smtClean="0">
-                <a:cs typeface="B Nazanin" pitchFamily="2" charset="-78"/>
-              </a:rPr>
-              <a:t>انصراف از ارسال خطا</a:t>
-            </a:r>
-          </a:p>
-          <a:p>
-            <a:pPr algn="just" rtl="1"/>
-            <a:r>
-              <a:rPr lang="fa-IR" sz="1400" dirty="0" smtClean="0">
-                <a:solidFill>
-                  <a:srgbClr val="FF0000"/>
-                </a:solidFill>
-              </a:rPr>
               <a:t>7- </a:t>
             </a:r>
             <a:r>
-              <a:rPr lang="fa-IR" sz="1400" dirty="0" smtClean="0">
-                <a:cs typeface="B Nazanin" pitchFamily="2" charset="-78"/>
-              </a:rPr>
-              <a:t>بستن</a:t>
-            </a:r>
-            <a:endParaRPr lang="fa-IR" sz="1400" dirty="0">
-              <a:cs typeface="B Nazanin" pitchFamily="2" charset="-78"/>
-            </a:endParaRPr>
+              <a:rPr lang="en-US" sz="1400" dirty="0" smtClean="0"/>
+              <a:t>Close this window.</a:t>
+            </a:r>
+            <a:endParaRPr lang="en-US" sz="1400" dirty="0"/>
           </a:p>
         </p:txBody>
       </p:sp>
@@ -27729,7 +27581,7 @@
       </p:grpSpPr>
       <p:pic>
         <p:nvPicPr>
-          <p:cNvPr id="4" name="Picture 3"/>
+          <p:cNvPr id="29" name="Picture 28"/>
           <p:cNvPicPr>
             <a:picLocks noChangeAspect="1"/>
           </p:cNvPicPr>
@@ -27749,49 +27601,14 @@
         </p:blipFill>
         <p:spPr>
           <a:xfrm>
-            <a:off x="3540825" y="900475"/>
-            <a:ext cx="5208595" cy="5786325"/>
+            <a:off x="3450422" y="856260"/>
+            <a:ext cx="5337303" cy="5937409"/>
           </a:xfrm>
           <a:prstGeom prst="rect">
             <a:avLst/>
           </a:prstGeom>
         </p:spPr>
       </p:pic>
-      <p:sp>
-        <p:nvSpPr>
-          <p:cNvPr id="2" name="Title 1"/>
-          <p:cNvSpPr>
-            <a:spLocks noGrp="1"/>
-          </p:cNvSpPr>
-          <p:nvPr>
-            <p:ph type="title"/>
-          </p:nvPr>
-        </p:nvSpPr>
-        <p:spPr>
-          <a:xfrm>
-            <a:off x="457200" y="0"/>
-            <a:ext cx="8229600" cy="1143000"/>
-          </a:xfrm>
-        </p:spPr>
-        <p:txBody>
-          <a:bodyPr>
-            <a:normAutofit/>
-          </a:bodyPr>
-          <a:lstStyle/>
-          <a:p>
-            <a:r>
-              <a:rPr lang="fa-IR" sz="2800" dirty="0" smtClean="0">
-                <a:solidFill>
-                  <a:srgbClr val="0070C0"/>
-                </a:solidFill>
-                <a:cs typeface="B Titr" pitchFamily="2" charset="-78"/>
-              </a:rPr>
-              <a:t>راهنمای پنجره تماس مستقیم</a:t>
-            </a:r>
-            <a:endParaRPr lang="en-US" sz="2800" dirty="0"/>
-          </a:p>
-        </p:txBody>
-      </p:sp>
       <p:sp>
         <p:nvSpPr>
           <p:cNvPr id="38" name="Rectangle 37"/>
@@ -27800,8 +27617,8 @@
         </p:nvSpPr>
         <p:spPr>
           <a:xfrm>
-            <a:off x="417143" y="1056564"/>
-            <a:ext cx="5336867" cy="2893100"/>
+            <a:off x="417143" y="838200"/>
+            <a:ext cx="5336867" cy="3539430"/>
           </a:xfrm>
           <a:prstGeom prst="rect">
             <a:avLst/>
@@ -27813,34 +27630,24 @@
           </a:bodyPr>
           <a:lstStyle/>
           <a:p>
-            <a:pPr algn="just" rtl="1"/>
+            <a:pPr algn="just"/>
             <a:r>
               <a:rPr lang="en-US" sz="1400" dirty="0" smtClean="0">
                 <a:solidFill>
                   <a:srgbClr val="FF0000"/>
                 </a:solidFill>
               </a:rPr>
-              <a:t>1</a:t>
-            </a:r>
-            <a:r>
-              <a:rPr lang="fa-IR" sz="1400" dirty="0" smtClean="0">
-                <a:solidFill>
-                  <a:srgbClr val="FF0000"/>
-                </a:solidFill>
-              </a:rPr>
-              <a:t>-</a:t>
-            </a:r>
-            <a:r>
-              <a:rPr lang="fa-IR" sz="1400" dirty="0" smtClean="0">
-                <a:cs typeface="B Nazanin" pitchFamily="2" charset="-78"/>
-              </a:rPr>
-              <a:t> آیکون نشاندهنده وضعیت فعلی فرد (آفلاین، آنلاین، مشغول کنفرانس و ...)</a:t>
-            </a:r>
-          </a:p>
-          <a:p>
-            <a:pPr algn="just" rtl="1"/>
-            <a:r>
-              <a:rPr lang="fa-IR" sz="1400" dirty="0">
+              <a:t>1- </a:t>
+            </a:r>
+            <a:r>
+              <a:rPr lang="en-US" sz="1400" dirty="0" smtClean="0"/>
+              <a:t>Person’s Current Status Icon (OFFLINE, ONLINE, BUSY, …)</a:t>
+            </a:r>
+          </a:p>
+          <a:p>
+            <a:pPr algn="just"/>
+            <a:r>
+              <a:rPr lang="en-US" sz="1400" dirty="0" smtClean="0">
                 <a:solidFill>
                   <a:srgbClr val="FF0000"/>
                 </a:solidFill>
@@ -27848,16 +27655,14 @@
               <a:t>2- </a:t>
             </a:r>
             <a:r>
-              <a:rPr lang="fa-IR" sz="1400" dirty="0" smtClean="0">
-                <a:cs typeface="B Nazanin" pitchFamily="2" charset="-78"/>
-              </a:rPr>
-              <a:t>نام و نام خانوادگی فرد</a:t>
-            </a:r>
-          </a:p>
-          <a:p>
-            <a:pPr algn="just" rtl="1"/>
-            <a:r>
-              <a:rPr lang="fa-IR" sz="1400" dirty="0" smtClean="0">
+              <a:rPr lang="en-US" sz="1400" dirty="0" smtClean="0"/>
+              <a:t>Name and Family of this person</a:t>
+            </a:r>
+          </a:p>
+          <a:p>
+            <a:pPr algn="just"/>
+            <a:r>
+              <a:rPr lang="en-US" sz="1400" dirty="0" smtClean="0">
                 <a:solidFill>
                   <a:srgbClr val="FF0000"/>
                 </a:solidFill>
@@ -27865,178 +27670,249 @@
               <a:t>3- </a:t>
             </a:r>
             <a:r>
-              <a:rPr lang="fa-IR" sz="1400" dirty="0" smtClean="0">
-                <a:cs typeface="B Nazanin" pitchFamily="2" charset="-78"/>
-              </a:rPr>
-              <a:t>اگر فرد در لیست مخاطبین تان نباشد، می توانید با کلیک روی این علامت، وی را به لیست مخاطبین تان اضافه کنید تا از این پس برای تماس با وی یا دعوتش به جلسات تان، نیازی به جستجویش نداشته باشید. اما اگر فرد در لیست مخاطبین تان باشد، بجای این علامت، علامت </a:t>
-            </a:r>
+              <a:rPr lang="en-US" sz="1400" dirty="0" smtClean="0"/>
+              <a:t>If this person is not in your contact list, you can add them to your contact list by clicking on this Icon, so you will not need to search them again to call them or invite them to your conferences. If this person is already in your contact list, you will see a X Icon here, which could delete him from your contact list.</a:t>
+            </a:r>
+            <a:endParaRPr lang="en-US" sz="1400" dirty="0"/>
+          </a:p>
+          <a:p>
+            <a:pPr algn="just"/>
             <a:r>
               <a:rPr lang="en-US" sz="1400" dirty="0" smtClean="0">
-                <a:cs typeface="B Nazanin" pitchFamily="2" charset="-78"/>
-              </a:rPr>
-              <a:t>X</a:t>
-            </a:r>
-            <a:r>
-              <a:rPr lang="fa-IR" sz="1400" dirty="0" smtClean="0">
-                <a:cs typeface="B Nazanin" pitchFamily="2" charset="-78"/>
-              </a:rPr>
-              <a:t> می بینید که با کلیک روی آن، نام فرد از لیست مخاطبین تان حذف می شود.</a:t>
-            </a:r>
-            <a:endParaRPr lang="en-US" sz="1400" dirty="0">
+                <a:solidFill>
+                  <a:srgbClr val="FF0000"/>
+                </a:solidFill>
+              </a:rPr>
+              <a:t>4- </a:t>
+            </a:r>
+            <a:r>
+              <a:rPr lang="en-US" sz="1400" dirty="0" smtClean="0"/>
+              <a:t>Organization of this person</a:t>
+            </a:r>
+            <a:endParaRPr lang="en-US" sz="1400" dirty="0"/>
+          </a:p>
+          <a:p>
+            <a:pPr algn="just"/>
+            <a:r>
+              <a:rPr lang="en-US" sz="1400" dirty="0" smtClean="0">
+                <a:solidFill>
+                  <a:srgbClr val="FF0000"/>
+                </a:solidFill>
+              </a:rPr>
+              <a:t>5- </a:t>
+            </a:r>
+            <a:r>
+              <a:rPr lang="en-US" sz="1400" dirty="0"/>
+              <a:t>C</a:t>
+            </a:r>
+            <a:r>
+              <a:rPr lang="en-US" sz="1400" dirty="0" smtClean="0"/>
+              <a:t>alling number of this person, with below format:</a:t>
+            </a:r>
+          </a:p>
+          <a:p>
+            <a:pPr algn="just"/>
+            <a:r>
+              <a:rPr lang="en-US" sz="1400" dirty="0" smtClean="0"/>
+              <a:t>“(Organization Number) Person Number”</a:t>
+            </a:r>
+          </a:p>
+          <a:p>
+            <a:pPr algn="just"/>
+            <a:r>
+              <a:rPr lang="en-US" sz="1400" dirty="0" smtClean="0"/>
+              <a:t>You can search people by their number here or you can call them by this number using </a:t>
+            </a:r>
+            <a:r>
+              <a:rPr lang="en-US" sz="1400" dirty="0" err="1" smtClean="0"/>
+              <a:t>DialPad</a:t>
+            </a:r>
+            <a:r>
+              <a:rPr lang="en-US" sz="1400" dirty="0" smtClean="0"/>
+              <a:t> tab.</a:t>
+            </a:r>
+          </a:p>
+          <a:p>
+            <a:pPr algn="just"/>
+            <a:r>
+              <a:rPr lang="en-US" sz="1400" dirty="0" smtClean="0">
+                <a:solidFill>
+                  <a:srgbClr val="FF0000"/>
+                </a:solidFill>
+              </a:rPr>
+              <a:t>6- </a:t>
+            </a:r>
+            <a:r>
+              <a:rPr lang="en-US" sz="1400" dirty="0" smtClean="0"/>
+              <a:t>By clicking on this button, you can make a video call to this person.</a:t>
+            </a:r>
+          </a:p>
+          <a:p>
+            <a:pPr algn="just"/>
+            <a:r>
+              <a:rPr lang="en-US" sz="1400" dirty="0" smtClean="0">
+                <a:solidFill>
+                  <a:srgbClr val="FF0000"/>
+                </a:solidFill>
+              </a:rPr>
+              <a:t>7- </a:t>
+            </a:r>
+            <a:r>
+              <a:rPr lang="en-US" sz="1400" dirty="0"/>
+              <a:t>By clicking on this button, you can make a </a:t>
+            </a:r>
+            <a:r>
+              <a:rPr lang="en-US" sz="1400" dirty="0" smtClean="0"/>
+              <a:t>voice </a:t>
+            </a:r>
+            <a:r>
+              <a:rPr lang="en-US" sz="1400" dirty="0"/>
+              <a:t>call to this person.</a:t>
+            </a:r>
+          </a:p>
+          <a:p>
+            <a:pPr algn="just"/>
+            <a:r>
+              <a:rPr lang="en-US" sz="1400" dirty="0" smtClean="0">
+                <a:solidFill>
+                  <a:srgbClr val="FF0000"/>
+                </a:solidFill>
+              </a:rPr>
+              <a:t>8- </a:t>
+            </a:r>
+            <a:r>
+              <a:rPr lang="en-US" sz="1400" dirty="0"/>
+              <a:t>By clicking on this button, you can </a:t>
+            </a:r>
+            <a:r>
+              <a:rPr lang="en-US" sz="1400" dirty="0" smtClean="0"/>
+              <a:t>send/receive text messages </a:t>
+            </a:r>
+            <a:r>
+              <a:rPr lang="en-US" sz="1400" dirty="0"/>
+              <a:t>to this person</a:t>
+            </a:r>
+            <a:r>
+              <a:rPr lang="en-US" sz="1400" dirty="0" smtClean="0"/>
+              <a:t>.</a:t>
+            </a:r>
+            <a:endParaRPr lang="en-US" sz="1400" dirty="0"/>
+          </a:p>
+        </p:txBody>
+      </p:sp>
+      <p:sp>
+        <p:nvSpPr>
+          <p:cNvPr id="70" name="Rectangle 69"/>
+          <p:cNvSpPr/>
+          <p:nvPr/>
+        </p:nvSpPr>
+        <p:spPr>
+          <a:xfrm>
+            <a:off x="304800" y="6230607"/>
+            <a:ext cx="3145622" cy="523220"/>
+          </a:xfrm>
+          <a:prstGeom prst="rect">
+            <a:avLst/>
+          </a:prstGeom>
+        </p:spPr>
+        <p:txBody>
+          <a:bodyPr wrap="square">
+            <a:spAutoFit/>
+          </a:bodyPr>
+          <a:lstStyle/>
+          <a:p>
+            <a:pPr algn="just"/>
+            <a:r>
+              <a:rPr lang="en-US" sz="1400" dirty="0" smtClean="0">
+                <a:solidFill>
+                  <a:schemeClr val="accent3">
+                    <a:lumMod val="50000"/>
+                  </a:schemeClr>
+                </a:solidFill>
+                <a:latin typeface="Tahoma" pitchFamily="34" charset="0"/>
+                <a:ea typeface="Tahoma" pitchFamily="34" charset="0"/>
+                <a:cs typeface="Tahoma" pitchFamily="34" charset="0"/>
+              </a:rPr>
+              <a:t>Click on    </a:t>
+            </a:r>
+            <a:r>
+              <a:rPr lang="en-US" sz="1400" dirty="0" smtClean="0">
+                <a:solidFill>
+                  <a:schemeClr val="accent3">
+                    <a:lumMod val="50000"/>
+                  </a:schemeClr>
+                </a:solidFill>
+                <a:latin typeface="Tahoma" pitchFamily="34" charset="0"/>
+                <a:ea typeface="Tahoma" pitchFamily="34" charset="0"/>
+                <a:cs typeface="Tahoma" pitchFamily="34" charset="0"/>
+              </a:rPr>
+              <a:t>to </a:t>
+            </a:r>
+            <a:r>
+              <a:rPr lang="en-US" sz="1400" dirty="0" smtClean="0">
+                <a:solidFill>
+                  <a:schemeClr val="accent3">
+                    <a:lumMod val="50000"/>
+                  </a:schemeClr>
+                </a:solidFill>
+                <a:latin typeface="Tahoma" pitchFamily="34" charset="0"/>
+                <a:ea typeface="Tahoma" pitchFamily="34" charset="0"/>
+                <a:cs typeface="Tahoma" pitchFamily="34" charset="0"/>
+              </a:rPr>
+              <a:t>see guide for parts, which are in front of this sign.</a:t>
+            </a:r>
+            <a:endParaRPr lang="fa-IR" sz="1400" dirty="0" smtClean="0">
               <a:solidFill>
-                <a:srgbClr val="FF0000"/>
+                <a:schemeClr val="accent3">
+                  <a:lumMod val="50000"/>
+                </a:schemeClr>
               </a:solidFill>
+              <a:latin typeface="Tahoma" pitchFamily="34" charset="0"/>
+              <a:ea typeface="Tahoma" pitchFamily="34" charset="0"/>
+              <a:cs typeface="Tahoma" pitchFamily="34" charset="0"/>
             </a:endParaRPr>
           </a:p>
-          <a:p>
-            <a:pPr algn="just" rtl="1"/>
-            <a:r>
-              <a:rPr lang="fa-IR" sz="1400" dirty="0" smtClean="0">
-                <a:solidFill>
-                  <a:srgbClr val="FF0000"/>
-                </a:solidFill>
-              </a:rPr>
-              <a:t>4- </a:t>
-            </a:r>
-            <a:r>
-              <a:rPr lang="fa-IR" sz="1400" dirty="0" smtClean="0">
-                <a:cs typeface="B Nazanin" pitchFamily="2" charset="-78"/>
-              </a:rPr>
-              <a:t>نام سازمان فرد مورد نظر</a:t>
-            </a:r>
-            <a:endParaRPr lang="en-US" sz="1400" dirty="0" smtClean="0">
-              <a:solidFill>
-                <a:srgbClr val="FF0000"/>
-              </a:solidFill>
-            </a:endParaRPr>
-          </a:p>
-          <a:p>
-            <a:pPr algn="just" rtl="1"/>
-            <a:r>
-              <a:rPr lang="fa-IR" sz="1400" dirty="0" smtClean="0">
-                <a:solidFill>
-                  <a:srgbClr val="FF0000"/>
-                </a:solidFill>
-              </a:rPr>
-              <a:t>5-</a:t>
-            </a:r>
-            <a:r>
-              <a:rPr lang="fa-IR" sz="1400" dirty="0" smtClean="0">
-                <a:solidFill>
-                  <a:srgbClr val="FF0000"/>
-                </a:solidFill>
-                <a:cs typeface="B Nazanin" pitchFamily="2" charset="-78"/>
-              </a:rPr>
-              <a:t> </a:t>
-            </a:r>
-            <a:r>
-              <a:rPr lang="fa-IR" sz="1400" dirty="0" smtClean="0">
-                <a:cs typeface="B Nazanin" pitchFamily="2" charset="-78"/>
-              </a:rPr>
-              <a:t>شماره تماس با فرد مورد نظر در قالب «شماره فرد (پیش شماره سازمان)» است. یکی دیگر از راههای تماس با افراد، تماس با این شماره از طریق سربرگ شماره گیر است.</a:t>
-            </a:r>
-          </a:p>
-          <a:p>
-            <a:pPr algn="just" rtl="1"/>
-            <a:r>
-              <a:rPr lang="fa-IR" sz="1400" dirty="0" smtClean="0">
-                <a:solidFill>
-                  <a:srgbClr val="FF0000"/>
-                </a:solidFill>
-              </a:rPr>
-              <a:t>6- </a:t>
-            </a:r>
-            <a:r>
-              <a:rPr lang="fa-IR" sz="1400" dirty="0" smtClean="0">
-                <a:cs typeface="B Nazanin" pitchFamily="2" charset="-78"/>
-              </a:rPr>
-              <a:t>با زدن این دکمه تماس تصویری با فرد مورد نظر برقرار می گردد.</a:t>
-            </a:r>
-          </a:p>
-          <a:p>
-            <a:pPr algn="just" rtl="1"/>
-            <a:r>
-              <a:rPr lang="fa-IR" sz="1400" dirty="0" smtClean="0">
-                <a:solidFill>
-                  <a:srgbClr val="FF0000"/>
-                </a:solidFill>
-              </a:rPr>
-              <a:t>7- </a:t>
-            </a:r>
-            <a:r>
-              <a:rPr lang="fa-IR" sz="1400" dirty="0">
-                <a:cs typeface="B Nazanin" pitchFamily="2" charset="-78"/>
-              </a:rPr>
-              <a:t>با زدن این دکمه تماس </a:t>
-            </a:r>
-            <a:r>
-              <a:rPr lang="fa-IR" sz="1400" dirty="0" smtClean="0">
-                <a:cs typeface="B Nazanin" pitchFamily="2" charset="-78"/>
-              </a:rPr>
-              <a:t>صوتی </a:t>
-            </a:r>
-            <a:r>
-              <a:rPr lang="fa-IR" sz="1400" dirty="0">
-                <a:cs typeface="B Nazanin" pitchFamily="2" charset="-78"/>
-              </a:rPr>
-              <a:t>با فرد مورد نظر برقرار می گردد.</a:t>
-            </a:r>
-            <a:endParaRPr lang="fa-IR" sz="1400" dirty="0">
-              <a:solidFill>
-                <a:srgbClr val="FF0000"/>
-              </a:solidFill>
-              <a:cs typeface="B Nazanin" pitchFamily="2" charset="-78"/>
-            </a:endParaRPr>
-          </a:p>
-          <a:p>
-            <a:pPr algn="just" rtl="1"/>
-            <a:r>
-              <a:rPr lang="fa-IR" sz="1400" dirty="0" smtClean="0">
-                <a:solidFill>
-                  <a:srgbClr val="FF0000"/>
-                </a:solidFill>
-              </a:rPr>
-              <a:t>8- </a:t>
-            </a:r>
-            <a:r>
-              <a:rPr lang="fa-IR" sz="1400" dirty="0">
-                <a:cs typeface="B Nazanin" pitchFamily="2" charset="-78"/>
-              </a:rPr>
-              <a:t>با زدن این دکمه </a:t>
-            </a:r>
-            <a:r>
-              <a:rPr lang="fa-IR" sz="1400" dirty="0" smtClean="0">
-                <a:cs typeface="B Nazanin" pitchFamily="2" charset="-78"/>
-              </a:rPr>
-              <a:t>می‌توانید برای این فرد پیام متنی ارسال/دریافت کنید.</a:t>
-            </a:r>
-            <a:endParaRPr lang="fa-IR" sz="1400" dirty="0">
-              <a:solidFill>
-                <a:srgbClr val="FF0000"/>
-              </a:solidFill>
-              <a:cs typeface="B Nazanin" pitchFamily="2" charset="-78"/>
-            </a:endParaRPr>
-          </a:p>
-          <a:p>
-            <a:pPr algn="just" rtl="1"/>
-            <a:endParaRPr lang="fa-IR" sz="1400" dirty="0">
-              <a:solidFill>
-                <a:srgbClr val="FF0000"/>
-              </a:solidFill>
-              <a:cs typeface="B Nazanin" pitchFamily="2" charset="-78"/>
-            </a:endParaRPr>
-          </a:p>
-        </p:txBody>
-      </p:sp>
-      <p:sp>
-        <p:nvSpPr>
-          <p:cNvPr id="27" name="TextBox 26"/>
+        </p:txBody>
+      </p:sp>
+      <p:pic>
+        <p:nvPicPr>
+          <p:cNvPr id="71" name="Picture 70"/>
+          <p:cNvPicPr>
+            <a:picLocks noChangeAspect="1"/>
+          </p:cNvPicPr>
+          <p:nvPr/>
+        </p:nvPicPr>
+        <p:blipFill>
+          <a:blip r:embed="rId3">
+            <a:extLst>
+              <a:ext uri="{28A0092B-C50C-407E-A947-70E740481C1C}">
+                <a14:useLocalDpi xmlns:a14="http://schemas.microsoft.com/office/drawing/2010/main"/>
+              </a:ext>
+            </a:extLst>
+          </a:blip>
+          <a:stretch>
+            <a:fillRect/>
+          </a:stretch>
+        </p:blipFill>
+        <p:spPr>
+          <a:xfrm>
+            <a:off x="1091757" y="6264731"/>
+            <a:ext cx="266195" cy="266195"/>
+          </a:xfrm>
+          <a:prstGeom prst="rect">
+            <a:avLst/>
+          </a:prstGeom>
+        </p:spPr>
+      </p:pic>
+      <p:sp>
+        <p:nvSpPr>
+          <p:cNvPr id="30" name="TextBox 29"/>
           <p:cNvSpPr txBox="1"/>
           <p:nvPr/>
         </p:nvSpPr>
         <p:spPr>
           <a:xfrm>
-            <a:off x="5688275" y="4050268"/>
+            <a:off x="5638800" y="4050268"/>
             <a:ext cx="338860" cy="369332"/>
           </a:xfrm>
           <a:prstGeom prst="rect">
@@ -28068,15 +27944,15 @@
       </p:sp>
       <p:cxnSp>
         <p:nvCxnSpPr>
-          <p:cNvPr id="28" name="Straight Arrow Connector 27"/>
+          <p:cNvPr id="40" name="Straight Arrow Connector 39"/>
           <p:cNvCxnSpPr>
-            <a:stCxn id="27" idx="2"/>
+            <a:stCxn id="30" idx="2"/>
           </p:cNvCxnSpPr>
           <p:nvPr/>
         </p:nvCxnSpPr>
         <p:spPr>
           <a:xfrm>
-            <a:off x="5857705" y="4419600"/>
+            <a:off x="5808230" y="4419600"/>
             <a:ext cx="0" cy="269617"/>
           </a:xfrm>
           <a:prstGeom prst="straightConnector1">
@@ -28103,13 +27979,13 @@
       </p:cxnSp>
       <p:sp>
         <p:nvSpPr>
-          <p:cNvPr id="34" name="TextBox 33"/>
+          <p:cNvPr id="50" name="TextBox 49"/>
           <p:cNvSpPr txBox="1"/>
           <p:nvPr/>
         </p:nvSpPr>
         <p:spPr>
           <a:xfrm>
-            <a:off x="4747150" y="4022659"/>
+            <a:off x="4495800" y="4022659"/>
             <a:ext cx="338860" cy="369332"/>
           </a:xfrm>
           <a:prstGeom prst="rect">
@@ -28141,15 +28017,15 @@
       </p:sp>
       <p:cxnSp>
         <p:nvCxnSpPr>
-          <p:cNvPr id="35" name="Straight Arrow Connector 34"/>
+          <p:cNvPr id="51" name="Straight Arrow Connector 50"/>
           <p:cNvCxnSpPr>
-            <a:stCxn id="34" idx="2"/>
+            <a:stCxn id="50" idx="2"/>
           </p:cNvCxnSpPr>
           <p:nvPr/>
         </p:nvCxnSpPr>
         <p:spPr>
           <a:xfrm>
-            <a:off x="4916580" y="4391991"/>
+            <a:off x="4665230" y="4391991"/>
             <a:ext cx="0" cy="404101"/>
           </a:xfrm>
           <a:prstGeom prst="straightConnector1">
@@ -28176,13 +28052,13 @@
       </p:cxnSp>
       <p:sp>
         <p:nvSpPr>
-          <p:cNvPr id="36" name="TextBox 35"/>
+          <p:cNvPr id="52" name="TextBox 51"/>
           <p:cNvSpPr txBox="1"/>
           <p:nvPr/>
         </p:nvSpPr>
         <p:spPr>
           <a:xfrm>
-            <a:off x="3742700" y="4050268"/>
+            <a:off x="3716975" y="4050268"/>
             <a:ext cx="338860" cy="369332"/>
           </a:xfrm>
           <a:prstGeom prst="rect">
@@ -28214,15 +28090,15 @@
       </p:sp>
       <p:cxnSp>
         <p:nvCxnSpPr>
-          <p:cNvPr id="37" name="Straight Arrow Connector 36"/>
+          <p:cNvPr id="53" name="Straight Arrow Connector 52"/>
           <p:cNvCxnSpPr>
-            <a:stCxn id="36" idx="2"/>
+            <a:stCxn id="52" idx="2"/>
           </p:cNvCxnSpPr>
           <p:nvPr/>
         </p:nvCxnSpPr>
         <p:spPr>
           <a:xfrm>
-            <a:off x="3912130" y="4419600"/>
+            <a:off x="3886405" y="4419600"/>
             <a:ext cx="0" cy="190293"/>
           </a:xfrm>
           <a:prstGeom prst="straightConnector1">
@@ -28249,7 +28125,7 @@
       </p:cxnSp>
       <p:sp>
         <p:nvSpPr>
-          <p:cNvPr id="41" name="TextBox 40"/>
+          <p:cNvPr id="54" name="TextBox 53"/>
           <p:cNvSpPr txBox="1"/>
           <p:nvPr/>
         </p:nvSpPr>
@@ -28287,16 +28163,16 @@
       </p:sp>
       <p:cxnSp>
         <p:nvCxnSpPr>
-          <p:cNvPr id="42" name="Straight Arrow Connector 41"/>
+          <p:cNvPr id="55" name="Straight Arrow Connector 54"/>
           <p:cNvCxnSpPr>
-            <a:stCxn id="41" idx="3"/>
+            <a:stCxn id="54" idx="3"/>
           </p:cNvCxnSpPr>
           <p:nvPr/>
         </p:nvCxnSpPr>
         <p:spPr>
           <a:xfrm>
             <a:off x="3170256" y="4987381"/>
-            <a:ext cx="1325544" cy="0"/>
+            <a:ext cx="628468" cy="6713"/>
           </a:xfrm>
           <a:prstGeom prst="straightConnector1">
             <a:avLst/>
@@ -28322,7 +28198,7 @@
       </p:cxnSp>
       <p:sp>
         <p:nvSpPr>
-          <p:cNvPr id="43" name="TextBox 42"/>
+          <p:cNvPr id="56" name="TextBox 55"/>
           <p:cNvSpPr txBox="1"/>
           <p:nvPr/>
         </p:nvSpPr>
@@ -28360,16 +28236,16 @@
       </p:sp>
       <p:cxnSp>
         <p:nvCxnSpPr>
-          <p:cNvPr id="44" name="Straight Arrow Connector 43"/>
+          <p:cNvPr id="57" name="Straight Arrow Connector 56"/>
           <p:cNvCxnSpPr>
-            <a:stCxn id="43" idx="3"/>
+            <a:stCxn id="56" idx="3"/>
           </p:cNvCxnSpPr>
           <p:nvPr/>
         </p:nvCxnSpPr>
         <p:spPr>
-          <a:xfrm flipV="1">
-            <a:off x="3177849" y="5172047"/>
-            <a:ext cx="1241751" cy="6713"/>
+          <a:xfrm>
+            <a:off x="3177849" y="5178760"/>
+            <a:ext cx="590692" cy="0"/>
           </a:xfrm>
           <a:prstGeom prst="straightConnector1">
             <a:avLst/>
@@ -28395,13 +28271,13 @@
       </p:cxnSp>
       <p:sp>
         <p:nvSpPr>
-          <p:cNvPr id="45" name="TextBox 44"/>
+          <p:cNvPr id="58" name="TextBox 57"/>
           <p:cNvSpPr txBox="1"/>
           <p:nvPr/>
         </p:nvSpPr>
         <p:spPr>
           <a:xfrm>
-            <a:off x="2854823" y="5284727"/>
+            <a:off x="2854823" y="5321918"/>
             <a:ext cx="338860" cy="369332"/>
           </a:xfrm>
           <a:prstGeom prst="rect">
@@ -28433,15 +28309,15 @@
       </p:sp>
       <p:cxnSp>
         <p:nvCxnSpPr>
-          <p:cNvPr id="46" name="Straight Arrow Connector 45"/>
+          <p:cNvPr id="59" name="Straight Arrow Connector 58"/>
           <p:cNvCxnSpPr>
-            <a:stCxn id="45" idx="3"/>
+            <a:stCxn id="58" idx="3"/>
           </p:cNvCxnSpPr>
           <p:nvPr/>
         </p:nvCxnSpPr>
         <p:spPr>
           <a:xfrm>
-            <a:off x="3193683" y="5469393"/>
+            <a:off x="3193683" y="5506584"/>
             <a:ext cx="1149717" cy="0"/>
           </a:xfrm>
           <a:prstGeom prst="straightConnector1">
@@ -28468,13 +28344,13 @@
       </p:cxnSp>
       <p:sp>
         <p:nvSpPr>
-          <p:cNvPr id="21" name="TextBox 20"/>
+          <p:cNvPr id="60" name="TextBox 59"/>
           <p:cNvSpPr txBox="1"/>
           <p:nvPr/>
         </p:nvSpPr>
         <p:spPr>
           <a:xfrm>
-            <a:off x="2854823" y="5626925"/>
+            <a:off x="2854823" y="5638800"/>
             <a:ext cx="338860" cy="369332"/>
           </a:xfrm>
           <a:prstGeom prst="rect">
@@ -28506,15 +28382,15 @@
       </p:sp>
       <p:cxnSp>
         <p:nvCxnSpPr>
-          <p:cNvPr id="22" name="Straight Arrow Connector 21"/>
+          <p:cNvPr id="61" name="Straight Arrow Connector 60"/>
           <p:cNvCxnSpPr>
-            <a:stCxn id="21" idx="3"/>
+            <a:stCxn id="60" idx="3"/>
           </p:cNvCxnSpPr>
           <p:nvPr/>
         </p:nvCxnSpPr>
         <p:spPr>
           <a:xfrm>
-            <a:off x="3193683" y="5811591"/>
+            <a:off x="3193683" y="5823466"/>
             <a:ext cx="1149717" cy="0"/>
           </a:xfrm>
           <a:prstGeom prst="straightConnector1">
@@ -28541,13 +28417,13 @@
       </p:cxnSp>
       <p:sp>
         <p:nvSpPr>
-          <p:cNvPr id="23" name="TextBox 22"/>
+          <p:cNvPr id="62" name="TextBox 61"/>
           <p:cNvSpPr txBox="1"/>
           <p:nvPr/>
         </p:nvSpPr>
         <p:spPr>
           <a:xfrm>
-            <a:off x="2868471" y="5926037"/>
+            <a:off x="2868471" y="5949787"/>
             <a:ext cx="338860" cy="369332"/>
           </a:xfrm>
           <a:prstGeom prst="rect">
@@ -28579,15 +28455,15 @@
       </p:sp>
       <p:cxnSp>
         <p:nvCxnSpPr>
-          <p:cNvPr id="24" name="Straight Arrow Connector 23"/>
+          <p:cNvPr id="63" name="Straight Arrow Connector 62"/>
           <p:cNvCxnSpPr>
-            <a:stCxn id="23" idx="3"/>
+            <a:stCxn id="62" idx="3"/>
           </p:cNvCxnSpPr>
           <p:nvPr/>
         </p:nvCxnSpPr>
         <p:spPr>
           <a:xfrm>
-            <a:off x="3207331" y="6110703"/>
+            <a:off x="3207331" y="6134453"/>
             <a:ext cx="1212269" cy="0"/>
           </a:xfrm>
           <a:prstGeom prst="straightConnector1">
@@ -28614,7 +28490,7 @@
       </p:cxnSp>
       <p:sp>
         <p:nvSpPr>
-          <p:cNvPr id="32" name="Right Brace 31"/>
+          <p:cNvPr id="64" name="Right Brace 63"/>
           <p:cNvSpPr/>
           <p:nvPr/>
         </p:nvSpPr>
@@ -28652,7 +28528,7 @@
       </p:sp>
       <p:sp>
         <p:nvSpPr>
-          <p:cNvPr id="33" name="Right Brace 32"/>
+          <p:cNvPr id="65" name="Right Brace 64"/>
           <p:cNvSpPr/>
           <p:nvPr/>
         </p:nvSpPr>
@@ -28690,7 +28566,7 @@
       </p:sp>
       <p:sp>
         <p:nvSpPr>
-          <p:cNvPr id="47" name="Right Brace 46"/>
+          <p:cNvPr id="66" name="Right Brace 65"/>
           <p:cNvSpPr/>
           <p:nvPr/>
         </p:nvSpPr>
@@ -28728,7 +28604,7 @@
       </p:sp>
       <p:pic>
         <p:nvPicPr>
-          <p:cNvPr id="2050" name="Picture 2" descr="\\172.16.4.177\temp\Shooka\Hashemian\Guide Numbering-01-01-01-01.png"/>
+          <p:cNvPr id="67" name="Picture 2" descr="\\172.16.4.177\temp\Shooka\Hashemian\Guide Numbering-01-01-01-01.png"/>
           <p:cNvPicPr>
             <a:picLocks noChangeAspect="1" noChangeArrowheads="1"/>
           </p:cNvPicPr>
@@ -28769,7 +28645,7 @@
       </p:pic>
       <p:pic>
         <p:nvPicPr>
-          <p:cNvPr id="48" name="Picture 2" descr="\\172.16.4.177\temp\Shooka\Hashemian\Guide Numbering-01-01-01-01.png"/>
+          <p:cNvPr id="68" name="Picture 2" descr="\\172.16.4.177\temp\Shooka\Hashemian\Guide Numbering-01-01-01-01.png"/>
           <p:cNvPicPr>
             <a:picLocks noChangeAspect="1" noChangeArrowheads="1"/>
           </p:cNvPicPr>
@@ -28810,7 +28686,7 @@
       </p:pic>
       <p:pic>
         <p:nvPicPr>
-          <p:cNvPr id="49" name="Picture 2" descr="\\172.16.4.177\temp\Shooka\Hashemian\Guide Numbering-01-01-01-01.png"/>
+          <p:cNvPr id="69" name="Picture 2" descr="\\172.16.4.177\temp\Shooka\Hashemian\Guide Numbering-01-01-01-01.png"/>
           <p:cNvPicPr>
             <a:picLocks noChangeAspect="1" noChangeArrowheads="1"/>
           </p:cNvPicPr>
@@ -28851,70 +28727,39 @@
       </p:pic>
       <p:sp>
         <p:nvSpPr>
-          <p:cNvPr id="31" name="Rectangle 30"/>
-          <p:cNvSpPr/>
-          <p:nvPr/>
-        </p:nvSpPr>
-        <p:spPr>
-          <a:xfrm>
-            <a:off x="232276" y="3707073"/>
-            <a:ext cx="5225424" cy="307777"/>
-          </a:xfrm>
-          <a:prstGeom prst="rect">
-            <a:avLst/>
-          </a:prstGeom>
-        </p:spPr>
-        <p:txBody>
-          <a:bodyPr wrap="square">
-            <a:spAutoFit/>
+          <p:cNvPr id="2" name="Title 1"/>
+          <p:cNvSpPr>
+            <a:spLocks noGrp="1"/>
+          </p:cNvSpPr>
+          <p:nvPr>
+            <p:ph type="title"/>
+          </p:nvPr>
+        </p:nvSpPr>
+        <p:spPr>
+          <a:xfrm>
+            <a:off x="457200" y="0"/>
+            <a:ext cx="8229600" cy="1143000"/>
+          </a:xfrm>
+        </p:spPr>
+        <p:txBody>
+          <a:bodyPr>
+            <a:normAutofit/>
           </a:bodyPr>
           <a:lstStyle/>
           <a:p>
-            <a:pPr algn="just" rtl="1"/>
-            <a:r>
-              <a:rPr lang="fa-IR" sz="1400" dirty="0" smtClean="0">
-                <a:solidFill>
-                  <a:schemeClr val="accent3">
-                    <a:lumMod val="50000"/>
-                  </a:schemeClr>
-                </a:solidFill>
-                <a:cs typeface="B Nazanin" pitchFamily="2" charset="-78"/>
-              </a:rPr>
-              <a:t>جهت مشاهده راهنمای بخشهایی که جلوی علامت        هستند، روی علامت کلیک کنید.</a:t>
-            </a:r>
-          </a:p>
-        </p:txBody>
-      </p:sp>
-      <p:pic>
-        <p:nvPicPr>
-          <p:cNvPr id="39" name="Picture 38"/>
-          <p:cNvPicPr>
-            <a:picLocks noChangeAspect="1"/>
-          </p:cNvPicPr>
-          <p:nvPr/>
-        </p:nvPicPr>
-        <p:blipFill>
-          <a:blip r:embed="rId3">
-            <a:extLst>
-              <a:ext uri="{28A0092B-C50C-407E-A947-70E740481C1C}">
-                <a14:useLocalDpi xmlns:a14="http://schemas.microsoft.com/office/drawing/2010/main"/>
-              </a:ext>
-            </a:extLst>
-          </a:blip>
-          <a:stretch>
-            <a:fillRect/>
-          </a:stretch>
-        </p:blipFill>
-        <p:spPr>
-          <a:xfrm>
-            <a:off x="2379020" y="3745852"/>
-            <a:ext cx="253968" cy="253968"/>
-          </a:xfrm>
-          <a:prstGeom prst="rect">
-            <a:avLst/>
-          </a:prstGeom>
-        </p:spPr>
-      </p:pic>
+            <a:r>
+              <a:rPr lang="en-US" sz="2800" b="1" dirty="0" smtClean="0">
+                <a:solidFill>
+                  <a:srgbClr val="0070C0"/>
+                </a:solidFill>
+                <a:cs typeface="B Titr" pitchFamily="2" charset="-78"/>
+              </a:rPr>
+              <a:t>Direct Call Window</a:t>
+            </a:r>
+            <a:endParaRPr lang="en-US" sz="2800" b="1" dirty="0"/>
+          </a:p>
+        </p:txBody>
+      </p:sp>
     </p:spTree>
     <p:extLst>
       <p:ext uri="{BB962C8B-B14F-4D97-AF65-F5344CB8AC3E}">

</xml_diff>